<commit_message>
Revised presentation on Ice Cream Server
Going to submit to Robert of CNRI.
</commit_message>
<xml_diff>
--- a/Ice_Cream_Server.pptx
+++ b/Ice_Cream_Server.pptx
@@ -244,7 +244,7 @@
           <a:p>
             <a:fld id="{09A8F5D6-AF3A-4847-9A07-E52DA9F035A8}" type="datetimeFigureOut">
               <a:rPr lang="en-US" smtClean="0"/>
-              <a:t>2/22/2021</a:t>
+              <a:t>12/29/2021</a:t>
             </a:fld>
             <a:endParaRPr lang="en-US"/>
           </a:p>
@@ -658,7 +658,7 @@
           <a:p>
             <a:fld id="{724478B9-A8CF-43AB-A8E3-1804CA51C4AD}" type="datetimeFigureOut">
               <a:rPr lang="en-US" smtClean="0"/>
-              <a:t>2/22/2021</a:t>
+              <a:t>12/29/2021</a:t>
             </a:fld>
             <a:endParaRPr lang="en-US"/>
           </a:p>
@@ -856,7 +856,7 @@
           <a:p>
             <a:fld id="{724478B9-A8CF-43AB-A8E3-1804CA51C4AD}" type="datetimeFigureOut">
               <a:rPr lang="en-US" smtClean="0"/>
-              <a:t>2/22/2021</a:t>
+              <a:t>12/29/2021</a:t>
             </a:fld>
             <a:endParaRPr lang="en-US"/>
           </a:p>
@@ -1064,7 +1064,7 @@
           <a:p>
             <a:fld id="{724478B9-A8CF-43AB-A8E3-1804CA51C4AD}" type="datetimeFigureOut">
               <a:rPr lang="en-US" smtClean="0"/>
-              <a:t>2/22/2021</a:t>
+              <a:t>12/29/2021</a:t>
             </a:fld>
             <a:endParaRPr lang="en-US"/>
           </a:p>
@@ -1262,7 +1262,7 @@
           <a:p>
             <a:fld id="{724478B9-A8CF-43AB-A8E3-1804CA51C4AD}" type="datetimeFigureOut">
               <a:rPr lang="en-US" smtClean="0"/>
-              <a:t>2/22/2021</a:t>
+              <a:t>12/29/2021</a:t>
             </a:fld>
             <a:endParaRPr lang="en-US"/>
           </a:p>
@@ -1537,7 +1537,7 @@
           <a:p>
             <a:fld id="{724478B9-A8CF-43AB-A8E3-1804CA51C4AD}" type="datetimeFigureOut">
               <a:rPr lang="en-US" smtClean="0"/>
-              <a:t>2/22/2021</a:t>
+              <a:t>12/29/2021</a:t>
             </a:fld>
             <a:endParaRPr lang="en-US"/>
           </a:p>
@@ -1802,7 +1802,7 @@
           <a:p>
             <a:fld id="{724478B9-A8CF-43AB-A8E3-1804CA51C4AD}" type="datetimeFigureOut">
               <a:rPr lang="en-US" smtClean="0"/>
-              <a:t>2/22/2021</a:t>
+              <a:t>12/29/2021</a:t>
             </a:fld>
             <a:endParaRPr lang="en-US"/>
           </a:p>
@@ -2214,7 +2214,7 @@
           <a:p>
             <a:fld id="{724478B9-A8CF-43AB-A8E3-1804CA51C4AD}" type="datetimeFigureOut">
               <a:rPr lang="en-US" smtClean="0"/>
-              <a:t>2/22/2021</a:t>
+              <a:t>12/29/2021</a:t>
             </a:fld>
             <a:endParaRPr lang="en-US"/>
           </a:p>
@@ -2355,7 +2355,7 @@
           <a:p>
             <a:fld id="{724478B9-A8CF-43AB-A8E3-1804CA51C4AD}" type="datetimeFigureOut">
               <a:rPr lang="en-US" smtClean="0"/>
-              <a:t>2/22/2021</a:t>
+              <a:t>12/29/2021</a:t>
             </a:fld>
             <a:endParaRPr lang="en-US"/>
           </a:p>
@@ -2468,7 +2468,7 @@
           <a:p>
             <a:fld id="{724478B9-A8CF-43AB-A8E3-1804CA51C4AD}" type="datetimeFigureOut">
               <a:rPr lang="en-US" smtClean="0"/>
-              <a:t>2/22/2021</a:t>
+              <a:t>12/29/2021</a:t>
             </a:fld>
             <a:endParaRPr lang="en-US"/>
           </a:p>
@@ -2779,7 +2779,7 @@
           <a:p>
             <a:fld id="{724478B9-A8CF-43AB-A8E3-1804CA51C4AD}" type="datetimeFigureOut">
               <a:rPr lang="en-US" smtClean="0"/>
-              <a:t>2/22/2021</a:t>
+              <a:t>12/29/2021</a:t>
             </a:fld>
             <a:endParaRPr lang="en-US"/>
           </a:p>
@@ -3067,7 +3067,7 @@
           <a:p>
             <a:fld id="{724478B9-A8CF-43AB-A8E3-1804CA51C4AD}" type="datetimeFigureOut">
               <a:rPr lang="en-US" smtClean="0"/>
-              <a:t>2/22/2021</a:t>
+              <a:t>12/29/2021</a:t>
             </a:fld>
             <a:endParaRPr lang="en-US"/>
           </a:p>
@@ -3308,7 +3308,7 @@
           <a:p>
             <a:fld id="{724478B9-A8CF-43AB-A8E3-1804CA51C4AD}" type="datetimeFigureOut">
               <a:rPr lang="en-US" smtClean="0"/>
-              <a:t>2/22/2021</a:t>
+              <a:t>12/29/2021</a:t>
             </a:fld>
             <a:endParaRPr lang="en-US"/>
           </a:p>
@@ -7335,7 +7335,7 @@
             </a:r>
             <a:r>
               <a:rPr lang="en-US" sz="2800" dirty="0" err="1"/>
-              <a:t>DataBridge</a:t>
+              <a:t>Cordra</a:t>
             </a:r>
             <a:endParaRPr lang="en-US" sz="3600" dirty="0"/>
           </a:p>
@@ -10891,8 +10891,17 @@
               <a:rPr lang="en-US" dirty="0">
                 <a:latin typeface="+mn-lt"/>
               </a:rPr>
-              <a:t>Java Project Structure as of 02/21/21</a:t>
-            </a:r>
+              <a:t>Java Project Structure as </a:t>
+            </a:r>
+            <a:r>
+              <a:rPr lang="en-US">
+                <a:latin typeface="+mn-lt"/>
+              </a:rPr>
+              <a:t>of 12/29/21</a:t>
+            </a:r>
+            <a:endParaRPr lang="en-US" dirty="0">
+              <a:latin typeface="+mn-lt"/>
+            </a:endParaRPr>
           </a:p>
         </p:txBody>
       </p:sp>

</xml_diff>